<commit_message>
ICPP: Replace reindex figure.  Ran through aspell.  Manually align columns of bibliography on last page.
git-svn-id: svn://localhost/subsetter/trunk@98 803cb72c-d64d-0410-ae51-a9422f8e9f96
</commit_message>
<xml_diff>
--- a/papers/2010-ICPP/images/reindex.pptx
+++ b/papers/2010-ICPP/images/reindex.pptx
@@ -1,6 +1,6 @@
 
 <file path=ppt/presentation.xml><?xml version="1.0" encoding="utf-8"?>
-<p:presentation xmlns:a="http://schemas.openxmlformats.org/drawingml/2006/main" xmlns:r="http://schemas.openxmlformats.org/officeDocument/2006/relationships" xmlns:p="http://schemas.openxmlformats.org/presentationml/2006/main" saveSubsetFonts="1" autoCompressPictures="0">
+<p:presentation xmlns:a="http://schemas.openxmlformats.org/drawingml/2006/main" xmlns:r="http://schemas.openxmlformats.org/officeDocument/2006/relationships" xmlns:mc="http://schemas.openxmlformats.org/markup-compatibility/2006" xmlns:mv="urn:schemas-microsoft-com:mac:vml" xmlns:p="http://schemas.openxmlformats.org/presentationml/2006/main" mc:Ignorable="mv" mc:PreserveAttributes="mv:*" saveSubsetFonts="1" autoCompressPictures="0">
   <p:sldMasterIdLst>
     <p:sldMasterId id="2147483648" r:id="rId1"/>
   </p:sldMasterIdLst>
@@ -108,7 +108,7 @@
 </file>
 
 <file path=ppt/slideLayouts/slideLayout1.xml><?xml version="1.0" encoding="utf-8"?>
-<p:sldLayout xmlns:a="http://schemas.openxmlformats.org/drawingml/2006/main" xmlns:r="http://schemas.openxmlformats.org/officeDocument/2006/relationships" xmlns:p="http://schemas.openxmlformats.org/presentationml/2006/main" type="title" preserve="1">
+<p:sldLayout xmlns:a="http://schemas.openxmlformats.org/drawingml/2006/main" xmlns:r="http://schemas.openxmlformats.org/officeDocument/2006/relationships" xmlns:mc="http://schemas.openxmlformats.org/markup-compatibility/2006" xmlns:mv="urn:schemas-microsoft-com:mac:vml" xmlns:p="http://schemas.openxmlformats.org/presentationml/2006/main" mc:Ignorable="mv" mc:PreserveAttributes="mv:*" type="title" preserve="1">
   <p:cSld name="Title Slide">
     <p:spTree>
       <p:nvGrpSpPr>
@@ -289,7 +289,7 @@
             <a:fld id="{268DB075-DF6D-4B12-B5BB-CEB778FEBDC0}" type="datetimeFigureOut">
               <a:rPr lang="en-US" smtClean="0"/>
               <a:pPr/>
-              <a:t>2/19/2010</a:t>
+              <a:t>2/22/10</a:t>
             </a:fld>
             <a:endParaRPr lang="en-US"/>
           </a:p>
@@ -347,7 +347,7 @@
 </file>
 
 <file path=ppt/slideLayouts/slideLayout10.xml><?xml version="1.0" encoding="utf-8"?>
-<p:sldLayout xmlns:a="http://schemas.openxmlformats.org/drawingml/2006/main" xmlns:r="http://schemas.openxmlformats.org/officeDocument/2006/relationships" xmlns:p="http://schemas.openxmlformats.org/presentationml/2006/main" type="vertTx" preserve="1">
+<p:sldLayout xmlns:a="http://schemas.openxmlformats.org/drawingml/2006/main" xmlns:r="http://schemas.openxmlformats.org/officeDocument/2006/relationships" xmlns:mc="http://schemas.openxmlformats.org/markup-compatibility/2006" xmlns:mv="urn:schemas-microsoft-com:mac:vml" xmlns:p="http://schemas.openxmlformats.org/presentationml/2006/main" mc:Ignorable="mv" mc:PreserveAttributes="mv:*" type="vertTx" preserve="1">
   <p:cSld name="Title and Vertical Text">
     <p:spTree>
       <p:nvGrpSpPr>
@@ -456,7 +456,7 @@
             <a:fld id="{268DB075-DF6D-4B12-B5BB-CEB778FEBDC0}" type="datetimeFigureOut">
               <a:rPr lang="en-US" smtClean="0"/>
               <a:pPr/>
-              <a:t>2/19/2010</a:t>
+              <a:t>2/22/10</a:t>
             </a:fld>
             <a:endParaRPr lang="en-US"/>
           </a:p>
@@ -514,7 +514,7 @@
 </file>
 
 <file path=ppt/slideLayouts/slideLayout11.xml><?xml version="1.0" encoding="utf-8"?>
-<p:sldLayout xmlns:a="http://schemas.openxmlformats.org/drawingml/2006/main" xmlns:r="http://schemas.openxmlformats.org/officeDocument/2006/relationships" xmlns:p="http://schemas.openxmlformats.org/presentationml/2006/main" type="vertTitleAndTx" preserve="1">
+<p:sldLayout xmlns:a="http://schemas.openxmlformats.org/drawingml/2006/main" xmlns:r="http://schemas.openxmlformats.org/officeDocument/2006/relationships" xmlns:mc="http://schemas.openxmlformats.org/markup-compatibility/2006" xmlns:mv="urn:schemas-microsoft-com:mac:vml" xmlns:p="http://schemas.openxmlformats.org/presentationml/2006/main" mc:Ignorable="mv" mc:PreserveAttributes="mv:*" type="vertTitleAndTx" preserve="1">
   <p:cSld name="Vertical Title and Text">
     <p:spTree>
       <p:nvGrpSpPr>
@@ -633,7 +633,7 @@
             <a:fld id="{268DB075-DF6D-4B12-B5BB-CEB778FEBDC0}" type="datetimeFigureOut">
               <a:rPr lang="en-US" smtClean="0"/>
               <a:pPr/>
-              <a:t>2/19/2010</a:t>
+              <a:t>2/22/10</a:t>
             </a:fld>
             <a:endParaRPr lang="en-US"/>
           </a:p>
@@ -691,7 +691,7 @@
 </file>
 
 <file path=ppt/slideLayouts/slideLayout2.xml><?xml version="1.0" encoding="utf-8"?>
-<p:sldLayout xmlns:a="http://schemas.openxmlformats.org/drawingml/2006/main" xmlns:r="http://schemas.openxmlformats.org/officeDocument/2006/relationships" xmlns:p="http://schemas.openxmlformats.org/presentationml/2006/main" type="obj" preserve="1">
+<p:sldLayout xmlns:a="http://schemas.openxmlformats.org/drawingml/2006/main" xmlns:r="http://schemas.openxmlformats.org/officeDocument/2006/relationships" xmlns:mc="http://schemas.openxmlformats.org/markup-compatibility/2006" xmlns:mv="urn:schemas-microsoft-com:mac:vml" xmlns:p="http://schemas.openxmlformats.org/presentationml/2006/main" mc:Ignorable="mv" mc:PreserveAttributes="mv:*" type="obj" preserve="1">
   <p:cSld name="Title and Content">
     <p:spTree>
       <p:nvGrpSpPr>
@@ -800,7 +800,7 @@
             <a:fld id="{268DB075-DF6D-4B12-B5BB-CEB778FEBDC0}" type="datetimeFigureOut">
               <a:rPr lang="en-US" smtClean="0"/>
               <a:pPr/>
-              <a:t>2/19/2010</a:t>
+              <a:t>2/22/10</a:t>
             </a:fld>
             <a:endParaRPr lang="en-US"/>
           </a:p>
@@ -858,7 +858,7 @@
 </file>
 
 <file path=ppt/slideLayouts/slideLayout3.xml><?xml version="1.0" encoding="utf-8"?>
-<p:sldLayout xmlns:a="http://schemas.openxmlformats.org/drawingml/2006/main" xmlns:r="http://schemas.openxmlformats.org/officeDocument/2006/relationships" xmlns:p="http://schemas.openxmlformats.org/presentationml/2006/main" type="secHead" preserve="1">
+<p:sldLayout xmlns:a="http://schemas.openxmlformats.org/drawingml/2006/main" xmlns:r="http://schemas.openxmlformats.org/officeDocument/2006/relationships" xmlns:mc="http://schemas.openxmlformats.org/markup-compatibility/2006" xmlns:mv="urn:schemas-microsoft-com:mac:vml" xmlns:p="http://schemas.openxmlformats.org/presentationml/2006/main" mc:Ignorable="mv" mc:PreserveAttributes="mv:*" type="secHead" preserve="1">
   <p:cSld name="Section Header">
     <p:spTree>
       <p:nvGrpSpPr>
@@ -1043,7 +1043,7 @@
             <a:fld id="{268DB075-DF6D-4B12-B5BB-CEB778FEBDC0}" type="datetimeFigureOut">
               <a:rPr lang="en-US" smtClean="0"/>
               <a:pPr/>
-              <a:t>2/19/2010</a:t>
+              <a:t>2/22/10</a:t>
             </a:fld>
             <a:endParaRPr lang="en-US"/>
           </a:p>
@@ -1101,7 +1101,7 @@
 </file>
 
 <file path=ppt/slideLayouts/slideLayout4.xml><?xml version="1.0" encoding="utf-8"?>
-<p:sldLayout xmlns:a="http://schemas.openxmlformats.org/drawingml/2006/main" xmlns:r="http://schemas.openxmlformats.org/officeDocument/2006/relationships" xmlns:p="http://schemas.openxmlformats.org/presentationml/2006/main" type="twoObj" preserve="1">
+<p:sldLayout xmlns:a="http://schemas.openxmlformats.org/drawingml/2006/main" xmlns:r="http://schemas.openxmlformats.org/officeDocument/2006/relationships" xmlns:mc="http://schemas.openxmlformats.org/markup-compatibility/2006" xmlns:mv="urn:schemas-microsoft-com:mac:vml" xmlns:p="http://schemas.openxmlformats.org/presentationml/2006/main" mc:Ignorable="mv" mc:PreserveAttributes="mv:*" type="twoObj" preserve="1">
   <p:cSld name="Two Content">
     <p:spTree>
       <p:nvGrpSpPr>
@@ -1328,7 +1328,7 @@
             <a:fld id="{268DB075-DF6D-4B12-B5BB-CEB778FEBDC0}" type="datetimeFigureOut">
               <a:rPr lang="en-US" smtClean="0"/>
               <a:pPr/>
-              <a:t>2/19/2010</a:t>
+              <a:t>2/22/10</a:t>
             </a:fld>
             <a:endParaRPr lang="en-US"/>
           </a:p>
@@ -1386,7 +1386,7 @@
 </file>
 
 <file path=ppt/slideLayouts/slideLayout5.xml><?xml version="1.0" encoding="utf-8"?>
-<p:sldLayout xmlns:a="http://schemas.openxmlformats.org/drawingml/2006/main" xmlns:r="http://schemas.openxmlformats.org/officeDocument/2006/relationships" xmlns:p="http://schemas.openxmlformats.org/presentationml/2006/main" type="twoTxTwoObj" preserve="1">
+<p:sldLayout xmlns:a="http://schemas.openxmlformats.org/drawingml/2006/main" xmlns:r="http://schemas.openxmlformats.org/officeDocument/2006/relationships" xmlns:mc="http://schemas.openxmlformats.org/markup-compatibility/2006" xmlns:mv="urn:schemas-microsoft-com:mac:vml" xmlns:p="http://schemas.openxmlformats.org/presentationml/2006/main" mc:Ignorable="mv" mc:PreserveAttributes="mv:*" type="twoTxTwoObj" preserve="1">
   <p:cSld name="Comparison">
     <p:spTree>
       <p:nvGrpSpPr>
@@ -1747,7 +1747,7 @@
             <a:fld id="{268DB075-DF6D-4B12-B5BB-CEB778FEBDC0}" type="datetimeFigureOut">
               <a:rPr lang="en-US" smtClean="0"/>
               <a:pPr/>
-              <a:t>2/19/2010</a:t>
+              <a:t>2/22/10</a:t>
             </a:fld>
             <a:endParaRPr lang="en-US"/>
           </a:p>
@@ -1805,7 +1805,7 @@
 </file>
 
 <file path=ppt/slideLayouts/slideLayout6.xml><?xml version="1.0" encoding="utf-8"?>
-<p:sldLayout xmlns:a="http://schemas.openxmlformats.org/drawingml/2006/main" xmlns:r="http://schemas.openxmlformats.org/officeDocument/2006/relationships" xmlns:p="http://schemas.openxmlformats.org/presentationml/2006/main" type="titleOnly" preserve="1">
+<p:sldLayout xmlns:a="http://schemas.openxmlformats.org/drawingml/2006/main" xmlns:r="http://schemas.openxmlformats.org/officeDocument/2006/relationships" xmlns:mc="http://schemas.openxmlformats.org/markup-compatibility/2006" xmlns:mv="urn:schemas-microsoft-com:mac:vml" xmlns:p="http://schemas.openxmlformats.org/presentationml/2006/main" mc:Ignorable="mv" mc:PreserveAttributes="mv:*" type="titleOnly" preserve="1">
   <p:cSld name="Title Only">
     <p:spTree>
       <p:nvGrpSpPr>
@@ -1862,7 +1862,7 @@
             <a:fld id="{268DB075-DF6D-4B12-B5BB-CEB778FEBDC0}" type="datetimeFigureOut">
               <a:rPr lang="en-US" smtClean="0"/>
               <a:pPr/>
-              <a:t>2/19/2010</a:t>
+              <a:t>2/22/10</a:t>
             </a:fld>
             <a:endParaRPr lang="en-US"/>
           </a:p>
@@ -1920,7 +1920,7 @@
 </file>
 
 <file path=ppt/slideLayouts/slideLayout7.xml><?xml version="1.0" encoding="utf-8"?>
-<p:sldLayout xmlns:a="http://schemas.openxmlformats.org/drawingml/2006/main" xmlns:r="http://schemas.openxmlformats.org/officeDocument/2006/relationships" xmlns:p="http://schemas.openxmlformats.org/presentationml/2006/main" type="blank" preserve="1">
+<p:sldLayout xmlns:a="http://schemas.openxmlformats.org/drawingml/2006/main" xmlns:r="http://schemas.openxmlformats.org/officeDocument/2006/relationships" xmlns:mc="http://schemas.openxmlformats.org/markup-compatibility/2006" xmlns:mv="urn:schemas-microsoft-com:mac:vml" xmlns:p="http://schemas.openxmlformats.org/presentationml/2006/main" mc:Ignorable="mv" mc:PreserveAttributes="mv:*" type="blank" preserve="1">
   <p:cSld name="Blank">
     <p:spTree>
       <p:nvGrpSpPr>
@@ -1954,7 +1954,7 @@
             <a:fld id="{268DB075-DF6D-4B12-B5BB-CEB778FEBDC0}" type="datetimeFigureOut">
               <a:rPr lang="en-US" smtClean="0"/>
               <a:pPr/>
-              <a:t>2/19/2010</a:t>
+              <a:t>2/22/10</a:t>
             </a:fld>
             <a:endParaRPr lang="en-US"/>
           </a:p>
@@ -2012,7 +2012,7 @@
 </file>
 
 <file path=ppt/slideLayouts/slideLayout8.xml><?xml version="1.0" encoding="utf-8"?>
-<p:sldLayout xmlns:a="http://schemas.openxmlformats.org/drawingml/2006/main" xmlns:r="http://schemas.openxmlformats.org/officeDocument/2006/relationships" xmlns:p="http://schemas.openxmlformats.org/presentationml/2006/main" type="objTx" preserve="1">
+<p:sldLayout xmlns:a="http://schemas.openxmlformats.org/drawingml/2006/main" xmlns:r="http://schemas.openxmlformats.org/officeDocument/2006/relationships" xmlns:mc="http://schemas.openxmlformats.org/markup-compatibility/2006" xmlns:mv="urn:schemas-microsoft-com:mac:vml" xmlns:p="http://schemas.openxmlformats.org/presentationml/2006/main" mc:Ignorable="mv" mc:PreserveAttributes="mv:*" type="objTx" preserve="1">
   <p:cSld name="Content with Caption">
     <p:spTree>
       <p:nvGrpSpPr>
@@ -2228,7 +2228,7 @@
             <a:fld id="{268DB075-DF6D-4B12-B5BB-CEB778FEBDC0}" type="datetimeFigureOut">
               <a:rPr lang="en-US" smtClean="0"/>
               <a:pPr/>
-              <a:t>2/19/2010</a:t>
+              <a:t>2/22/10</a:t>
             </a:fld>
             <a:endParaRPr lang="en-US"/>
           </a:p>
@@ -2286,7 +2286,7 @@
 </file>
 
 <file path=ppt/slideLayouts/slideLayout9.xml><?xml version="1.0" encoding="utf-8"?>
-<p:sldLayout xmlns:a="http://schemas.openxmlformats.org/drawingml/2006/main" xmlns:r="http://schemas.openxmlformats.org/officeDocument/2006/relationships" xmlns:p="http://schemas.openxmlformats.org/presentationml/2006/main" type="picTx" preserve="1">
+<p:sldLayout xmlns:a="http://schemas.openxmlformats.org/drawingml/2006/main" xmlns:r="http://schemas.openxmlformats.org/officeDocument/2006/relationships" xmlns:mc="http://schemas.openxmlformats.org/markup-compatibility/2006" xmlns:mv="urn:schemas-microsoft-com:mac:vml" xmlns:p="http://schemas.openxmlformats.org/presentationml/2006/main" mc:Ignorable="mv" mc:PreserveAttributes="mv:*" type="picTx" preserve="1">
   <p:cSld name="Picture with Caption">
     <p:spTree>
       <p:nvGrpSpPr>
@@ -2478,7 +2478,7 @@
             <a:fld id="{268DB075-DF6D-4B12-B5BB-CEB778FEBDC0}" type="datetimeFigureOut">
               <a:rPr lang="en-US" smtClean="0"/>
               <a:pPr/>
-              <a:t>2/19/2010</a:t>
+              <a:t>2/22/10</a:t>
             </a:fld>
             <a:endParaRPr lang="en-US"/>
           </a:p>
@@ -2536,7 +2536,7 @@
 </file>
 
 <file path=ppt/slideMasters/slideMaster1.xml><?xml version="1.0" encoding="utf-8"?>
-<p:sldMaster xmlns:a="http://schemas.openxmlformats.org/drawingml/2006/main" xmlns:r="http://schemas.openxmlformats.org/officeDocument/2006/relationships" xmlns:p="http://schemas.openxmlformats.org/presentationml/2006/main">
+<p:sldMaster xmlns:a="http://schemas.openxmlformats.org/drawingml/2006/main" xmlns:r="http://schemas.openxmlformats.org/officeDocument/2006/relationships" xmlns:mc="http://schemas.openxmlformats.org/markup-compatibility/2006" xmlns:mv="urn:schemas-microsoft-com:mac:vml" xmlns:p="http://schemas.openxmlformats.org/presentationml/2006/main" mc:Ignorable="mv" mc:PreserveAttributes="mv:*">
   <p:cSld>
     <p:bg>
       <p:bgRef idx="1001">
@@ -2688,7 +2688,7 @@
             <a:fld id="{268DB075-DF6D-4B12-B5BB-CEB778FEBDC0}" type="datetimeFigureOut">
               <a:rPr lang="en-US" smtClean="0"/>
               <a:pPr/>
-              <a:t>2/19/2010</a:t>
+              <a:t>2/22/10</a:t>
             </a:fld>
             <a:endParaRPr lang="en-US"/>
           </a:p>
@@ -3043,7 +3043,7 @@
 </file>
 
 <file path=ppt/slides/slide1.xml><?xml version="1.0" encoding="utf-8"?>
-<p:sld xmlns:a="http://schemas.openxmlformats.org/drawingml/2006/main" xmlns:r="http://schemas.openxmlformats.org/officeDocument/2006/relationships" xmlns:p="http://schemas.openxmlformats.org/presentationml/2006/main">
+<p:sld xmlns:a="http://schemas.openxmlformats.org/drawingml/2006/main" xmlns:r="http://schemas.openxmlformats.org/officeDocument/2006/relationships" xmlns:mc="http://schemas.openxmlformats.org/markup-compatibility/2006" xmlns:mv="urn:schemas-microsoft-com:mac:vml" xmlns:p="http://schemas.openxmlformats.org/presentationml/2006/main" mc:Ignorable="mv" mc:PreserveAttributes="mv:*">
   <p:cSld>
     <p:spTree>
       <p:nvGrpSpPr>
@@ -6001,6 +6001,1973 @@
                 <a:cs typeface="Times New Roman" pitchFamily="18" charset="0"/>
               </a:rPr>
               <a:t>C</a:t>
+            </a:r>
+            <a:endParaRPr lang="en-US" sz="2400" dirty="0">
+              <a:latin typeface="Times New Roman" pitchFamily="18" charset="0"/>
+              <a:cs typeface="Times New Roman" pitchFamily="18" charset="0"/>
+            </a:endParaRPr>
+          </a:p>
+        </p:txBody>
+      </p:sp>
+      <p:sp>
+        <p:nvSpPr>
+          <p:cNvPr id="83" name="Rectangle 82"/>
+          <p:cNvSpPr/>
+          <p:nvPr/>
+        </p:nvSpPr>
+        <p:spPr>
+          <a:xfrm flipV="1">
+            <a:off x="1708833" y="3336221"/>
+            <a:ext cx="1530558" cy="187261"/>
+          </a:xfrm>
+          <a:prstGeom prst="rect">
+            <a:avLst/>
+          </a:prstGeom>
+          <a:gradFill flip="none" rotWithShape="1">
+            <a:gsLst>
+              <a:gs pos="0">
+                <a:schemeClr val="accent4">
+                  <a:lumMod val="60000"/>
+                  <a:lumOff val="40000"/>
+                  <a:tint val="66000"/>
+                  <a:satMod val="160000"/>
+                </a:schemeClr>
+              </a:gs>
+              <a:gs pos="50000">
+                <a:schemeClr val="accent4">
+                  <a:lumMod val="60000"/>
+                  <a:lumOff val="40000"/>
+                  <a:tint val="44500"/>
+                  <a:satMod val="160000"/>
+                </a:schemeClr>
+              </a:gs>
+              <a:gs pos="100000">
+                <a:schemeClr val="accent4">
+                  <a:lumMod val="60000"/>
+                  <a:lumOff val="40000"/>
+                  <a:tint val="23500"/>
+                  <a:satMod val="160000"/>
+                </a:schemeClr>
+              </a:gs>
+            </a:gsLst>
+            <a:lin ang="16200000" scaled="1"/>
+            <a:tileRect/>
+          </a:gradFill>
+        </p:spPr>
+        <p:style>
+          <a:lnRef idx="1">
+            <a:schemeClr val="accent1"/>
+          </a:lnRef>
+          <a:fillRef idx="3">
+            <a:schemeClr val="accent1"/>
+          </a:fillRef>
+          <a:effectRef idx="2">
+            <a:schemeClr val="accent1"/>
+          </a:effectRef>
+          <a:fontRef idx="minor">
+            <a:schemeClr val="lt1"/>
+          </a:fontRef>
+        </p:style>
+        <p:txBody>
+          <a:bodyPr rtlCol="0" anchor="ctr"/>
+          <a:lstStyle/>
+          <a:p>
+            <a:pPr algn="ctr"/>
+            <a:endParaRPr lang="en-US" dirty="0" smtClean="0"/>
+          </a:p>
+          <a:p>
+            <a:pPr algn="ctr"/>
+            <a:endParaRPr/>
+          </a:p>
+          <a:p>
+            <a:pPr algn="ctr"/>
+            <a:endParaRPr lang="en-US" dirty="0" smtClean="0"/>
+          </a:p>
+          <a:p>
+            <a:pPr algn="ctr"/>
+            <a:endParaRPr lang="en-US" dirty="0"/>
+          </a:p>
+        </p:txBody>
+      </p:sp>
+      <p:sp>
+        <p:nvSpPr>
+          <p:cNvPr id="84" name="Rectangle 83"/>
+          <p:cNvSpPr/>
+          <p:nvPr/>
+        </p:nvSpPr>
+        <p:spPr>
+          <a:xfrm flipV="1">
+            <a:off x="3391791" y="3336221"/>
+            <a:ext cx="1530558" cy="187261"/>
+          </a:xfrm>
+          <a:prstGeom prst="rect">
+            <a:avLst/>
+          </a:prstGeom>
+          <a:gradFill flip="none" rotWithShape="1">
+            <a:gsLst>
+              <a:gs pos="0">
+                <a:schemeClr val="accent4">
+                  <a:lumMod val="60000"/>
+                  <a:lumOff val="40000"/>
+                  <a:tint val="66000"/>
+                  <a:satMod val="160000"/>
+                </a:schemeClr>
+              </a:gs>
+              <a:gs pos="50000">
+                <a:schemeClr val="accent4">
+                  <a:lumMod val="60000"/>
+                  <a:lumOff val="40000"/>
+                  <a:tint val="44500"/>
+                  <a:satMod val="160000"/>
+                </a:schemeClr>
+              </a:gs>
+              <a:gs pos="100000">
+                <a:schemeClr val="accent4">
+                  <a:lumMod val="60000"/>
+                  <a:lumOff val="40000"/>
+                  <a:tint val="23500"/>
+                  <a:satMod val="160000"/>
+                </a:schemeClr>
+              </a:gs>
+            </a:gsLst>
+            <a:lin ang="16200000" scaled="1"/>
+            <a:tileRect/>
+          </a:gradFill>
+        </p:spPr>
+        <p:style>
+          <a:lnRef idx="1">
+            <a:schemeClr val="accent1"/>
+          </a:lnRef>
+          <a:fillRef idx="3">
+            <a:schemeClr val="accent1"/>
+          </a:fillRef>
+          <a:effectRef idx="2">
+            <a:schemeClr val="accent1"/>
+          </a:effectRef>
+          <a:fontRef idx="minor">
+            <a:schemeClr val="lt1"/>
+          </a:fontRef>
+        </p:style>
+        <p:txBody>
+          <a:bodyPr rtlCol="0" anchor="ctr"/>
+          <a:lstStyle/>
+          <a:p>
+            <a:pPr algn="ctr"/>
+            <a:endParaRPr lang="en-US" dirty="0" smtClean="0"/>
+          </a:p>
+          <a:p>
+            <a:pPr algn="ctr"/>
+            <a:endParaRPr/>
+          </a:p>
+          <a:p>
+            <a:pPr algn="ctr"/>
+            <a:endParaRPr lang="en-US" dirty="0" smtClean="0"/>
+          </a:p>
+          <a:p>
+            <a:pPr algn="ctr"/>
+            <a:endParaRPr lang="en-US" dirty="0"/>
+          </a:p>
+        </p:txBody>
+      </p:sp>
+      <p:sp>
+        <p:nvSpPr>
+          <p:cNvPr id="86" name="Rectangle 85"/>
+          <p:cNvSpPr/>
+          <p:nvPr/>
+        </p:nvSpPr>
+        <p:spPr>
+          <a:xfrm flipV="1">
+            <a:off x="5063465" y="3336221"/>
+            <a:ext cx="1530558" cy="187261"/>
+          </a:xfrm>
+          <a:prstGeom prst="rect">
+            <a:avLst/>
+          </a:prstGeom>
+          <a:gradFill flip="none" rotWithShape="1">
+            <a:gsLst>
+              <a:gs pos="0">
+                <a:schemeClr val="accent4">
+                  <a:lumMod val="60000"/>
+                  <a:lumOff val="40000"/>
+                  <a:tint val="66000"/>
+                  <a:satMod val="160000"/>
+                </a:schemeClr>
+              </a:gs>
+              <a:gs pos="50000">
+                <a:schemeClr val="accent4">
+                  <a:lumMod val="60000"/>
+                  <a:lumOff val="40000"/>
+                  <a:tint val="44500"/>
+                  <a:satMod val="160000"/>
+                </a:schemeClr>
+              </a:gs>
+              <a:gs pos="100000">
+                <a:schemeClr val="accent4">
+                  <a:lumMod val="60000"/>
+                  <a:lumOff val="40000"/>
+                  <a:tint val="23500"/>
+                  <a:satMod val="160000"/>
+                </a:schemeClr>
+              </a:gs>
+            </a:gsLst>
+            <a:lin ang="16200000" scaled="1"/>
+            <a:tileRect/>
+          </a:gradFill>
+        </p:spPr>
+        <p:style>
+          <a:lnRef idx="1">
+            <a:schemeClr val="accent1"/>
+          </a:lnRef>
+          <a:fillRef idx="3">
+            <a:schemeClr val="accent1"/>
+          </a:fillRef>
+          <a:effectRef idx="2">
+            <a:schemeClr val="accent1"/>
+          </a:effectRef>
+          <a:fontRef idx="minor">
+            <a:schemeClr val="lt1"/>
+          </a:fontRef>
+        </p:style>
+        <p:txBody>
+          <a:bodyPr rtlCol="0" anchor="ctr"/>
+          <a:lstStyle/>
+          <a:p>
+            <a:pPr algn="ctr"/>
+            <a:endParaRPr lang="en-US" dirty="0" smtClean="0"/>
+          </a:p>
+          <a:p>
+            <a:pPr algn="ctr"/>
+            <a:endParaRPr/>
+          </a:p>
+          <a:p>
+            <a:pPr algn="ctr"/>
+            <a:endParaRPr lang="en-US" dirty="0" smtClean="0"/>
+          </a:p>
+          <a:p>
+            <a:pPr algn="ctr"/>
+            <a:endParaRPr lang="en-US" dirty="0"/>
+          </a:p>
+        </p:txBody>
+      </p:sp>
+      <p:sp>
+        <p:nvSpPr>
+          <p:cNvPr id="87" name="Rectangle 86"/>
+          <p:cNvSpPr/>
+          <p:nvPr/>
+        </p:nvSpPr>
+        <p:spPr>
+          <a:xfrm flipV="1">
+            <a:off x="6735139" y="3336221"/>
+            <a:ext cx="1530558" cy="187261"/>
+          </a:xfrm>
+          <a:prstGeom prst="rect">
+            <a:avLst/>
+          </a:prstGeom>
+          <a:gradFill flip="none" rotWithShape="1">
+            <a:gsLst>
+              <a:gs pos="0">
+                <a:schemeClr val="accent4">
+                  <a:lumMod val="60000"/>
+                  <a:lumOff val="40000"/>
+                  <a:tint val="66000"/>
+                  <a:satMod val="160000"/>
+                </a:schemeClr>
+              </a:gs>
+              <a:gs pos="50000">
+                <a:schemeClr val="accent4">
+                  <a:lumMod val="60000"/>
+                  <a:lumOff val="40000"/>
+                  <a:tint val="44500"/>
+                  <a:satMod val="160000"/>
+                </a:schemeClr>
+              </a:gs>
+              <a:gs pos="100000">
+                <a:schemeClr val="accent4">
+                  <a:lumMod val="60000"/>
+                  <a:lumOff val="40000"/>
+                  <a:tint val="23500"/>
+                  <a:satMod val="160000"/>
+                </a:schemeClr>
+              </a:gs>
+            </a:gsLst>
+            <a:lin ang="16200000" scaled="1"/>
+            <a:tileRect/>
+          </a:gradFill>
+        </p:spPr>
+        <p:style>
+          <a:lnRef idx="1">
+            <a:schemeClr val="accent1"/>
+          </a:lnRef>
+          <a:fillRef idx="3">
+            <a:schemeClr val="accent1"/>
+          </a:fillRef>
+          <a:effectRef idx="2">
+            <a:schemeClr val="accent1"/>
+          </a:effectRef>
+          <a:fontRef idx="minor">
+            <a:schemeClr val="lt1"/>
+          </a:fontRef>
+        </p:style>
+        <p:txBody>
+          <a:bodyPr rtlCol="0" anchor="ctr"/>
+          <a:lstStyle/>
+          <a:p>
+            <a:pPr algn="ctr"/>
+            <a:endParaRPr lang="en-US" dirty="0" smtClean="0"/>
+          </a:p>
+          <a:p>
+            <a:pPr algn="ctr"/>
+            <a:endParaRPr/>
+          </a:p>
+          <a:p>
+            <a:pPr algn="ctr"/>
+            <a:endParaRPr lang="en-US" dirty="0" smtClean="0"/>
+          </a:p>
+          <a:p>
+            <a:pPr algn="ctr"/>
+            <a:endParaRPr lang="en-US" dirty="0"/>
+          </a:p>
+        </p:txBody>
+      </p:sp>
+      <p:sp>
+        <p:nvSpPr>
+          <p:cNvPr id="88" name="Rectangle 87"/>
+          <p:cNvSpPr/>
+          <p:nvPr/>
+        </p:nvSpPr>
+        <p:spPr>
+          <a:xfrm>
+            <a:off x="2008173" y="3336221"/>
+            <a:ext cx="182880" cy="182880"/>
+          </a:xfrm>
+          <a:prstGeom prst="rect">
+            <a:avLst/>
+          </a:prstGeom>
+          <a:solidFill>
+            <a:schemeClr val="tx2"/>
+          </a:solidFill>
+        </p:spPr>
+        <p:style>
+          <a:lnRef idx="1">
+            <a:schemeClr val="accent1"/>
+          </a:lnRef>
+          <a:fillRef idx="3">
+            <a:schemeClr val="accent1"/>
+          </a:fillRef>
+          <a:effectRef idx="2">
+            <a:schemeClr val="accent1"/>
+          </a:effectRef>
+          <a:fontRef idx="minor">
+            <a:schemeClr val="lt1"/>
+          </a:fontRef>
+        </p:style>
+        <p:txBody>
+          <a:bodyPr rtlCol="0" anchor="ctr"/>
+          <a:lstStyle/>
+          <a:p>
+            <a:pPr algn="ctr"/>
+            <a:endParaRPr lang="en-US"/>
+          </a:p>
+        </p:txBody>
+      </p:sp>
+      <p:sp>
+        <p:nvSpPr>
+          <p:cNvPr id="89" name="Rectangle 88"/>
+          <p:cNvSpPr/>
+          <p:nvPr/>
+        </p:nvSpPr>
+        <p:spPr>
+          <a:xfrm>
+            <a:off x="2398953" y="3341396"/>
+            <a:ext cx="182880" cy="182880"/>
+          </a:xfrm>
+          <a:prstGeom prst="rect">
+            <a:avLst/>
+          </a:prstGeom>
+          <a:solidFill>
+            <a:schemeClr val="accent2"/>
+          </a:solidFill>
+        </p:spPr>
+        <p:style>
+          <a:lnRef idx="1">
+            <a:schemeClr val="accent1"/>
+          </a:lnRef>
+          <a:fillRef idx="3">
+            <a:schemeClr val="accent1"/>
+          </a:fillRef>
+          <a:effectRef idx="2">
+            <a:schemeClr val="accent1"/>
+          </a:effectRef>
+          <a:fontRef idx="minor">
+            <a:schemeClr val="lt1"/>
+          </a:fontRef>
+        </p:style>
+        <p:txBody>
+          <a:bodyPr rtlCol="0" anchor="ctr"/>
+          <a:lstStyle/>
+          <a:p>
+            <a:pPr algn="ctr"/>
+            <a:endParaRPr lang="en-US"/>
+          </a:p>
+        </p:txBody>
+      </p:sp>
+      <p:sp>
+        <p:nvSpPr>
+          <p:cNvPr id="90" name="Rectangle 89"/>
+          <p:cNvSpPr/>
+          <p:nvPr/>
+        </p:nvSpPr>
+        <p:spPr>
+          <a:xfrm>
+            <a:off x="2870265" y="3336221"/>
+            <a:ext cx="182880" cy="182880"/>
+          </a:xfrm>
+          <a:prstGeom prst="rect">
+            <a:avLst/>
+          </a:prstGeom>
+          <a:solidFill>
+            <a:schemeClr val="accent3"/>
+          </a:solidFill>
+        </p:spPr>
+        <p:style>
+          <a:lnRef idx="1">
+            <a:schemeClr val="accent1"/>
+          </a:lnRef>
+          <a:fillRef idx="3">
+            <a:schemeClr val="accent1"/>
+          </a:fillRef>
+          <a:effectRef idx="2">
+            <a:schemeClr val="accent1"/>
+          </a:effectRef>
+          <a:fontRef idx="minor">
+            <a:schemeClr val="lt1"/>
+          </a:fontRef>
+        </p:style>
+        <p:txBody>
+          <a:bodyPr rtlCol="0" anchor="ctr"/>
+          <a:lstStyle/>
+          <a:p>
+            <a:pPr algn="ctr"/>
+            <a:endParaRPr lang="en-US"/>
+          </a:p>
+        </p:txBody>
+      </p:sp>
+      <p:sp>
+        <p:nvSpPr>
+          <p:cNvPr id="91" name="Rectangle 90"/>
+          <p:cNvSpPr/>
+          <p:nvPr/>
+        </p:nvSpPr>
+        <p:spPr>
+          <a:xfrm>
+            <a:off x="3391791" y="3336221"/>
+            <a:ext cx="182880" cy="182880"/>
+          </a:xfrm>
+          <a:prstGeom prst="rect">
+            <a:avLst/>
+          </a:prstGeom>
+          <a:solidFill>
+            <a:schemeClr val="accent4"/>
+          </a:solidFill>
+        </p:spPr>
+        <p:style>
+          <a:lnRef idx="1">
+            <a:schemeClr val="accent1"/>
+          </a:lnRef>
+          <a:fillRef idx="3">
+            <a:schemeClr val="accent1"/>
+          </a:fillRef>
+          <a:effectRef idx="2">
+            <a:schemeClr val="accent1"/>
+          </a:effectRef>
+          <a:fontRef idx="minor">
+            <a:schemeClr val="lt1"/>
+          </a:fontRef>
+        </p:style>
+        <p:txBody>
+          <a:bodyPr rtlCol="0" anchor="ctr"/>
+          <a:lstStyle/>
+          <a:p>
+            <a:pPr algn="ctr"/>
+            <a:endParaRPr lang="en-US"/>
+          </a:p>
+        </p:txBody>
+      </p:sp>
+      <p:sp>
+        <p:nvSpPr>
+          <p:cNvPr id="92" name="Rectangle 91"/>
+          <p:cNvSpPr/>
+          <p:nvPr/>
+        </p:nvSpPr>
+        <p:spPr>
+          <a:xfrm>
+            <a:off x="3886521" y="3336221"/>
+            <a:ext cx="182880" cy="182880"/>
+          </a:xfrm>
+          <a:prstGeom prst="rect">
+            <a:avLst/>
+          </a:prstGeom>
+          <a:solidFill>
+            <a:schemeClr val="accent6"/>
+          </a:solidFill>
+        </p:spPr>
+        <p:style>
+          <a:lnRef idx="1">
+            <a:schemeClr val="accent1"/>
+          </a:lnRef>
+          <a:fillRef idx="3">
+            <a:schemeClr val="accent1"/>
+          </a:fillRef>
+          <a:effectRef idx="2">
+            <a:schemeClr val="accent1"/>
+          </a:effectRef>
+          <a:fontRef idx="minor">
+            <a:schemeClr val="lt1"/>
+          </a:fontRef>
+        </p:style>
+        <p:txBody>
+          <a:bodyPr rtlCol="0" anchor="ctr"/>
+          <a:lstStyle/>
+          <a:p>
+            <a:pPr algn="ctr"/>
+            <a:endParaRPr lang="en-US"/>
+          </a:p>
+        </p:txBody>
+      </p:sp>
+      <p:sp>
+        <p:nvSpPr>
+          <p:cNvPr id="93" name="Rectangle 92"/>
+          <p:cNvSpPr/>
+          <p:nvPr/>
+        </p:nvSpPr>
+        <p:spPr>
+          <a:xfrm>
+            <a:off x="7887427" y="3336221"/>
+            <a:ext cx="182880" cy="182880"/>
+          </a:xfrm>
+          <a:prstGeom prst="rect">
+            <a:avLst/>
+          </a:prstGeom>
+          <a:solidFill>
+            <a:schemeClr val="accent2">
+              <a:lumMod val="40000"/>
+              <a:lumOff val="60000"/>
+            </a:schemeClr>
+          </a:solidFill>
+        </p:spPr>
+        <p:style>
+          <a:lnRef idx="1">
+            <a:schemeClr val="accent1"/>
+          </a:lnRef>
+          <a:fillRef idx="3">
+            <a:schemeClr val="accent1"/>
+          </a:fillRef>
+          <a:effectRef idx="2">
+            <a:schemeClr val="accent1"/>
+          </a:effectRef>
+          <a:fontRef idx="minor">
+            <a:schemeClr val="lt1"/>
+          </a:fontRef>
+        </p:style>
+        <p:txBody>
+          <a:bodyPr rtlCol="0" anchor="ctr"/>
+          <a:lstStyle/>
+          <a:p>
+            <a:pPr algn="ctr"/>
+            <a:endParaRPr lang="en-US"/>
+          </a:p>
+        </p:txBody>
+      </p:sp>
+      <p:sp>
+        <p:nvSpPr>
+          <p:cNvPr id="94" name="Rectangle 93"/>
+          <p:cNvSpPr/>
+          <p:nvPr/>
+        </p:nvSpPr>
+        <p:spPr>
+          <a:xfrm>
+            <a:off x="6939673" y="3336221"/>
+            <a:ext cx="182880" cy="182880"/>
+          </a:xfrm>
+          <a:prstGeom prst="rect">
+            <a:avLst/>
+          </a:prstGeom>
+          <a:solidFill>
+            <a:schemeClr val="bg2">
+              <a:lumMod val="75000"/>
+            </a:schemeClr>
+          </a:solidFill>
+        </p:spPr>
+        <p:style>
+          <a:lnRef idx="1">
+            <a:schemeClr val="accent1"/>
+          </a:lnRef>
+          <a:fillRef idx="3">
+            <a:schemeClr val="accent1"/>
+          </a:fillRef>
+          <a:effectRef idx="2">
+            <a:schemeClr val="accent1"/>
+          </a:effectRef>
+          <a:fontRef idx="minor">
+            <a:schemeClr val="lt1"/>
+          </a:fontRef>
+        </p:style>
+        <p:txBody>
+          <a:bodyPr rtlCol="0" anchor="ctr"/>
+          <a:lstStyle/>
+          <a:p>
+            <a:pPr algn="ctr"/>
+            <a:endParaRPr lang="en-US"/>
+          </a:p>
+        </p:txBody>
+      </p:sp>
+      <p:sp>
+        <p:nvSpPr>
+          <p:cNvPr id="113" name="Rectangle 112"/>
+          <p:cNvSpPr/>
+          <p:nvPr/>
+        </p:nvSpPr>
+        <p:spPr>
+          <a:xfrm flipV="1">
+            <a:off x="1708833" y="4109246"/>
+            <a:ext cx="1530558" cy="187261"/>
+          </a:xfrm>
+          <a:prstGeom prst="rect">
+            <a:avLst/>
+          </a:prstGeom>
+        </p:spPr>
+        <p:style>
+          <a:lnRef idx="1">
+            <a:schemeClr val="accent1"/>
+          </a:lnRef>
+          <a:fillRef idx="3">
+            <a:schemeClr val="accent1"/>
+          </a:fillRef>
+          <a:effectRef idx="2">
+            <a:schemeClr val="accent1"/>
+          </a:effectRef>
+          <a:fontRef idx="minor">
+            <a:schemeClr val="lt1"/>
+          </a:fontRef>
+        </p:style>
+        <p:txBody>
+          <a:bodyPr rtlCol="0" anchor="ctr"/>
+          <a:lstStyle/>
+          <a:p>
+            <a:pPr algn="ctr"/>
+            <a:endParaRPr lang="en-US" dirty="0" smtClean="0"/>
+          </a:p>
+          <a:p>
+            <a:pPr algn="ctr"/>
+            <a:endParaRPr/>
+          </a:p>
+          <a:p>
+            <a:pPr algn="ctr"/>
+            <a:endParaRPr lang="en-US" dirty="0" smtClean="0"/>
+          </a:p>
+          <a:p>
+            <a:pPr algn="ctr"/>
+            <a:endParaRPr lang="en-US" dirty="0"/>
+          </a:p>
+        </p:txBody>
+      </p:sp>
+      <p:sp>
+        <p:nvSpPr>
+          <p:cNvPr id="114" name="Rectangle 113"/>
+          <p:cNvSpPr/>
+          <p:nvPr/>
+        </p:nvSpPr>
+        <p:spPr>
+          <a:xfrm flipV="1">
+            <a:off x="3391791" y="4109246"/>
+            <a:ext cx="1530558" cy="187261"/>
+          </a:xfrm>
+          <a:prstGeom prst="rect">
+            <a:avLst/>
+          </a:prstGeom>
+        </p:spPr>
+        <p:style>
+          <a:lnRef idx="1">
+            <a:schemeClr val="accent1"/>
+          </a:lnRef>
+          <a:fillRef idx="3">
+            <a:schemeClr val="accent1"/>
+          </a:fillRef>
+          <a:effectRef idx="2">
+            <a:schemeClr val="accent1"/>
+          </a:effectRef>
+          <a:fontRef idx="minor">
+            <a:schemeClr val="lt1"/>
+          </a:fontRef>
+        </p:style>
+        <p:txBody>
+          <a:bodyPr rtlCol="0" anchor="ctr"/>
+          <a:lstStyle/>
+          <a:p>
+            <a:pPr algn="ctr"/>
+            <a:endParaRPr lang="en-US" dirty="0" smtClean="0"/>
+          </a:p>
+          <a:p>
+            <a:pPr algn="ctr"/>
+            <a:endParaRPr/>
+          </a:p>
+          <a:p>
+            <a:pPr algn="ctr"/>
+            <a:endParaRPr lang="en-US" dirty="0" smtClean="0"/>
+          </a:p>
+          <a:p>
+            <a:pPr algn="ctr"/>
+            <a:endParaRPr lang="en-US" dirty="0"/>
+          </a:p>
+        </p:txBody>
+      </p:sp>
+      <p:sp>
+        <p:nvSpPr>
+          <p:cNvPr id="115" name="Rectangle 114"/>
+          <p:cNvSpPr/>
+          <p:nvPr/>
+        </p:nvSpPr>
+        <p:spPr>
+          <a:xfrm flipV="1">
+            <a:off x="5063465" y="4109246"/>
+            <a:ext cx="1530558" cy="187261"/>
+          </a:xfrm>
+          <a:prstGeom prst="rect">
+            <a:avLst/>
+          </a:prstGeom>
+        </p:spPr>
+        <p:style>
+          <a:lnRef idx="1">
+            <a:schemeClr val="accent1"/>
+          </a:lnRef>
+          <a:fillRef idx="3">
+            <a:schemeClr val="accent1"/>
+          </a:fillRef>
+          <a:effectRef idx="2">
+            <a:schemeClr val="accent1"/>
+          </a:effectRef>
+          <a:fontRef idx="minor">
+            <a:schemeClr val="lt1"/>
+          </a:fontRef>
+        </p:style>
+        <p:txBody>
+          <a:bodyPr rtlCol="0" anchor="ctr"/>
+          <a:lstStyle/>
+          <a:p>
+            <a:pPr algn="ctr"/>
+            <a:endParaRPr lang="en-US" dirty="0" smtClean="0"/>
+          </a:p>
+          <a:p>
+            <a:pPr algn="ctr"/>
+            <a:endParaRPr/>
+          </a:p>
+          <a:p>
+            <a:pPr algn="ctr"/>
+            <a:endParaRPr lang="en-US" dirty="0" smtClean="0"/>
+          </a:p>
+          <a:p>
+            <a:pPr algn="ctr"/>
+            <a:endParaRPr lang="en-US" dirty="0"/>
+          </a:p>
+        </p:txBody>
+      </p:sp>
+      <p:sp>
+        <p:nvSpPr>
+          <p:cNvPr id="116" name="Rectangle 115"/>
+          <p:cNvSpPr/>
+          <p:nvPr/>
+        </p:nvSpPr>
+        <p:spPr>
+          <a:xfrm flipV="1">
+            <a:off x="6735139" y="4109246"/>
+            <a:ext cx="1530558" cy="187261"/>
+          </a:xfrm>
+          <a:prstGeom prst="rect">
+            <a:avLst/>
+          </a:prstGeom>
+        </p:spPr>
+        <p:style>
+          <a:lnRef idx="1">
+            <a:schemeClr val="accent1"/>
+          </a:lnRef>
+          <a:fillRef idx="3">
+            <a:schemeClr val="accent1"/>
+          </a:fillRef>
+          <a:effectRef idx="2">
+            <a:schemeClr val="accent1"/>
+          </a:effectRef>
+          <a:fontRef idx="minor">
+            <a:schemeClr val="lt1"/>
+          </a:fontRef>
+        </p:style>
+        <p:txBody>
+          <a:bodyPr rtlCol="0" anchor="ctr"/>
+          <a:lstStyle/>
+          <a:p>
+            <a:pPr algn="ctr"/>
+            <a:endParaRPr lang="en-US" dirty="0" smtClean="0"/>
+          </a:p>
+          <a:p>
+            <a:pPr algn="ctr"/>
+            <a:endParaRPr/>
+          </a:p>
+          <a:p>
+            <a:pPr algn="ctr"/>
+            <a:endParaRPr lang="en-US" dirty="0" smtClean="0"/>
+          </a:p>
+          <a:p>
+            <a:pPr algn="ctr"/>
+            <a:endParaRPr lang="en-US" dirty="0"/>
+          </a:p>
+        </p:txBody>
+      </p:sp>
+      <p:sp>
+        <p:nvSpPr>
+          <p:cNvPr id="117" name="Rectangle 116"/>
+          <p:cNvSpPr/>
+          <p:nvPr/>
+        </p:nvSpPr>
+        <p:spPr>
+          <a:xfrm flipV="1">
+            <a:off x="1708833" y="4296507"/>
+            <a:ext cx="1530558" cy="187261"/>
+          </a:xfrm>
+          <a:prstGeom prst="rect">
+            <a:avLst/>
+          </a:prstGeom>
+        </p:spPr>
+        <p:style>
+          <a:lnRef idx="1">
+            <a:schemeClr val="accent1"/>
+          </a:lnRef>
+          <a:fillRef idx="3">
+            <a:schemeClr val="accent1"/>
+          </a:fillRef>
+          <a:effectRef idx="2">
+            <a:schemeClr val="accent1"/>
+          </a:effectRef>
+          <a:fontRef idx="minor">
+            <a:schemeClr val="lt1"/>
+          </a:fontRef>
+        </p:style>
+        <p:txBody>
+          <a:bodyPr rtlCol="0" anchor="ctr"/>
+          <a:lstStyle/>
+          <a:p>
+            <a:pPr algn="ctr"/>
+            <a:endParaRPr lang="en-US" dirty="0" smtClean="0"/>
+          </a:p>
+          <a:p>
+            <a:pPr algn="ctr"/>
+            <a:endParaRPr/>
+          </a:p>
+          <a:p>
+            <a:pPr algn="ctr"/>
+            <a:endParaRPr lang="en-US" dirty="0" smtClean="0"/>
+          </a:p>
+          <a:p>
+            <a:pPr algn="ctr"/>
+            <a:endParaRPr lang="en-US" dirty="0"/>
+          </a:p>
+        </p:txBody>
+      </p:sp>
+      <p:sp>
+        <p:nvSpPr>
+          <p:cNvPr id="118" name="Rectangle 117"/>
+          <p:cNvSpPr/>
+          <p:nvPr/>
+        </p:nvSpPr>
+        <p:spPr>
+          <a:xfrm flipV="1">
+            <a:off x="3391791" y="4296507"/>
+            <a:ext cx="1530558" cy="187261"/>
+          </a:xfrm>
+          <a:prstGeom prst="rect">
+            <a:avLst/>
+          </a:prstGeom>
+        </p:spPr>
+        <p:style>
+          <a:lnRef idx="1">
+            <a:schemeClr val="accent1"/>
+          </a:lnRef>
+          <a:fillRef idx="3">
+            <a:schemeClr val="accent1"/>
+          </a:fillRef>
+          <a:effectRef idx="2">
+            <a:schemeClr val="accent1"/>
+          </a:effectRef>
+          <a:fontRef idx="minor">
+            <a:schemeClr val="lt1"/>
+          </a:fontRef>
+        </p:style>
+        <p:txBody>
+          <a:bodyPr rtlCol="0" anchor="ctr"/>
+          <a:lstStyle/>
+          <a:p>
+            <a:pPr algn="ctr"/>
+            <a:endParaRPr lang="en-US" dirty="0" smtClean="0"/>
+          </a:p>
+          <a:p>
+            <a:pPr algn="ctr"/>
+            <a:endParaRPr/>
+          </a:p>
+          <a:p>
+            <a:pPr algn="ctr"/>
+            <a:endParaRPr lang="en-US" dirty="0" smtClean="0"/>
+          </a:p>
+          <a:p>
+            <a:pPr algn="ctr"/>
+            <a:endParaRPr lang="en-US" dirty="0"/>
+          </a:p>
+        </p:txBody>
+      </p:sp>
+      <p:sp>
+        <p:nvSpPr>
+          <p:cNvPr id="119" name="Rectangle 118"/>
+          <p:cNvSpPr/>
+          <p:nvPr/>
+        </p:nvSpPr>
+        <p:spPr>
+          <a:xfrm flipV="1">
+            <a:off x="5063465" y="4296507"/>
+            <a:ext cx="1530558" cy="187261"/>
+          </a:xfrm>
+          <a:prstGeom prst="rect">
+            <a:avLst/>
+          </a:prstGeom>
+        </p:spPr>
+        <p:style>
+          <a:lnRef idx="1">
+            <a:schemeClr val="accent1"/>
+          </a:lnRef>
+          <a:fillRef idx="3">
+            <a:schemeClr val="accent1"/>
+          </a:fillRef>
+          <a:effectRef idx="2">
+            <a:schemeClr val="accent1"/>
+          </a:effectRef>
+          <a:fontRef idx="minor">
+            <a:schemeClr val="lt1"/>
+          </a:fontRef>
+        </p:style>
+        <p:txBody>
+          <a:bodyPr rtlCol="0" anchor="ctr"/>
+          <a:lstStyle/>
+          <a:p>
+            <a:pPr algn="ctr"/>
+            <a:endParaRPr lang="en-US" dirty="0" smtClean="0"/>
+          </a:p>
+          <a:p>
+            <a:pPr algn="ctr"/>
+            <a:endParaRPr/>
+          </a:p>
+          <a:p>
+            <a:pPr algn="ctr"/>
+            <a:endParaRPr lang="en-US" dirty="0" smtClean="0"/>
+          </a:p>
+          <a:p>
+            <a:pPr algn="ctr"/>
+            <a:endParaRPr lang="en-US" dirty="0"/>
+          </a:p>
+        </p:txBody>
+      </p:sp>
+      <p:sp>
+        <p:nvSpPr>
+          <p:cNvPr id="120" name="Rectangle 119"/>
+          <p:cNvSpPr/>
+          <p:nvPr/>
+        </p:nvSpPr>
+        <p:spPr>
+          <a:xfrm flipV="1">
+            <a:off x="6735139" y="4296507"/>
+            <a:ext cx="1530558" cy="187261"/>
+          </a:xfrm>
+          <a:prstGeom prst="rect">
+            <a:avLst/>
+          </a:prstGeom>
+        </p:spPr>
+        <p:style>
+          <a:lnRef idx="1">
+            <a:schemeClr val="accent1"/>
+          </a:lnRef>
+          <a:fillRef idx="3">
+            <a:schemeClr val="accent1"/>
+          </a:fillRef>
+          <a:effectRef idx="2">
+            <a:schemeClr val="accent1"/>
+          </a:effectRef>
+          <a:fontRef idx="minor">
+            <a:schemeClr val="lt1"/>
+          </a:fontRef>
+        </p:style>
+        <p:txBody>
+          <a:bodyPr rtlCol="0" anchor="ctr"/>
+          <a:lstStyle/>
+          <a:p>
+            <a:pPr algn="ctr"/>
+            <a:endParaRPr lang="en-US" dirty="0" smtClean="0"/>
+          </a:p>
+          <a:p>
+            <a:pPr algn="ctr"/>
+            <a:endParaRPr/>
+          </a:p>
+          <a:p>
+            <a:pPr algn="ctr"/>
+            <a:endParaRPr lang="en-US" dirty="0" smtClean="0"/>
+          </a:p>
+          <a:p>
+            <a:pPr algn="ctr"/>
+            <a:endParaRPr lang="en-US" dirty="0"/>
+          </a:p>
+        </p:txBody>
+      </p:sp>
+      <p:sp>
+        <p:nvSpPr>
+          <p:cNvPr id="122" name="Rectangle 121"/>
+          <p:cNvSpPr/>
+          <p:nvPr/>
+        </p:nvSpPr>
+        <p:spPr>
+          <a:xfrm flipV="1">
+            <a:off x="3711832" y="4296507"/>
+            <a:ext cx="182880" cy="187261"/>
+          </a:xfrm>
+          <a:prstGeom prst="rect">
+            <a:avLst/>
+          </a:prstGeom>
+          <a:solidFill>
+            <a:schemeClr val="tx2"/>
+          </a:solidFill>
+        </p:spPr>
+        <p:style>
+          <a:lnRef idx="1">
+            <a:schemeClr val="accent1"/>
+          </a:lnRef>
+          <a:fillRef idx="3">
+            <a:schemeClr val="accent1"/>
+          </a:fillRef>
+          <a:effectRef idx="2">
+            <a:schemeClr val="accent1"/>
+          </a:effectRef>
+          <a:fontRef idx="minor">
+            <a:schemeClr val="lt1"/>
+          </a:fontRef>
+        </p:style>
+        <p:txBody>
+          <a:bodyPr rtlCol="0" anchor="ctr"/>
+          <a:lstStyle/>
+          <a:p>
+            <a:pPr algn="ctr"/>
+            <a:endParaRPr lang="en-US" dirty="0" smtClean="0"/>
+          </a:p>
+          <a:p>
+            <a:pPr algn="ctr"/>
+            <a:endParaRPr/>
+          </a:p>
+          <a:p>
+            <a:pPr algn="ctr"/>
+            <a:endParaRPr lang="en-US" dirty="0" smtClean="0"/>
+          </a:p>
+          <a:p>
+            <a:pPr algn="ctr"/>
+            <a:endParaRPr lang="en-US" dirty="0"/>
+          </a:p>
+        </p:txBody>
+      </p:sp>
+      <p:sp>
+        <p:nvSpPr>
+          <p:cNvPr id="123" name="Rectangle 122"/>
+          <p:cNvSpPr/>
+          <p:nvPr/>
+        </p:nvSpPr>
+        <p:spPr>
+          <a:xfrm flipV="1">
+            <a:off x="3711831" y="4109244"/>
+            <a:ext cx="182880" cy="187261"/>
+          </a:xfrm>
+          <a:prstGeom prst="rect">
+            <a:avLst/>
+          </a:prstGeom>
+          <a:solidFill>
+            <a:schemeClr val="accent2"/>
+          </a:solidFill>
+        </p:spPr>
+        <p:style>
+          <a:lnRef idx="1">
+            <a:schemeClr val="accent1"/>
+          </a:lnRef>
+          <a:fillRef idx="3">
+            <a:schemeClr val="accent1"/>
+          </a:fillRef>
+          <a:effectRef idx="2">
+            <a:schemeClr val="accent1"/>
+          </a:effectRef>
+          <a:fontRef idx="minor">
+            <a:schemeClr val="lt1"/>
+          </a:fontRef>
+        </p:style>
+        <p:txBody>
+          <a:bodyPr rtlCol="0" anchor="ctr"/>
+          <a:lstStyle/>
+          <a:p>
+            <a:pPr algn="ctr"/>
+            <a:endParaRPr lang="en-US" dirty="0" smtClean="0"/>
+          </a:p>
+          <a:p>
+            <a:pPr algn="ctr"/>
+            <a:endParaRPr/>
+          </a:p>
+          <a:p>
+            <a:pPr algn="ctr"/>
+            <a:endParaRPr lang="en-US" dirty="0" smtClean="0"/>
+          </a:p>
+          <a:p>
+            <a:pPr algn="ctr"/>
+            <a:endParaRPr lang="en-US" dirty="0"/>
+          </a:p>
+        </p:txBody>
+      </p:sp>
+      <p:sp>
+        <p:nvSpPr>
+          <p:cNvPr id="124" name="Rectangle 123"/>
+          <p:cNvSpPr/>
+          <p:nvPr/>
+        </p:nvSpPr>
+        <p:spPr>
+          <a:xfrm flipV="1">
+            <a:off x="5063465" y="4296505"/>
+            <a:ext cx="182880" cy="187261"/>
+          </a:xfrm>
+          <a:prstGeom prst="rect">
+            <a:avLst/>
+          </a:prstGeom>
+          <a:solidFill>
+            <a:schemeClr val="accent2"/>
+          </a:solidFill>
+        </p:spPr>
+        <p:style>
+          <a:lnRef idx="1">
+            <a:schemeClr val="accent1"/>
+          </a:lnRef>
+          <a:fillRef idx="3">
+            <a:schemeClr val="accent1"/>
+          </a:fillRef>
+          <a:effectRef idx="2">
+            <a:schemeClr val="accent1"/>
+          </a:effectRef>
+          <a:fontRef idx="minor">
+            <a:schemeClr val="lt1"/>
+          </a:fontRef>
+        </p:style>
+        <p:txBody>
+          <a:bodyPr rtlCol="0" anchor="ctr"/>
+          <a:lstStyle/>
+          <a:p>
+            <a:pPr algn="ctr"/>
+            <a:endParaRPr lang="en-US" dirty="0" smtClean="0"/>
+          </a:p>
+          <a:p>
+            <a:pPr algn="ctr"/>
+            <a:endParaRPr/>
+          </a:p>
+          <a:p>
+            <a:pPr algn="ctr"/>
+            <a:endParaRPr lang="en-US" dirty="0" smtClean="0"/>
+          </a:p>
+          <a:p>
+            <a:pPr algn="ctr"/>
+            <a:endParaRPr lang="en-US" dirty="0"/>
+          </a:p>
+        </p:txBody>
+      </p:sp>
+      <p:sp>
+        <p:nvSpPr>
+          <p:cNvPr id="126" name="Rectangle 125"/>
+          <p:cNvSpPr/>
+          <p:nvPr/>
+        </p:nvSpPr>
+        <p:spPr>
+          <a:xfrm flipV="1">
+            <a:off x="5058871" y="4110040"/>
+            <a:ext cx="182880" cy="187261"/>
+          </a:xfrm>
+          <a:prstGeom prst="rect">
+            <a:avLst/>
+          </a:prstGeom>
+          <a:solidFill>
+            <a:schemeClr val="accent3"/>
+          </a:solidFill>
+        </p:spPr>
+        <p:style>
+          <a:lnRef idx="1">
+            <a:schemeClr val="accent1"/>
+          </a:lnRef>
+          <a:fillRef idx="3">
+            <a:schemeClr val="accent1"/>
+          </a:fillRef>
+          <a:effectRef idx="2">
+            <a:schemeClr val="accent1"/>
+          </a:effectRef>
+          <a:fontRef idx="minor">
+            <a:schemeClr val="lt1"/>
+          </a:fontRef>
+        </p:style>
+        <p:txBody>
+          <a:bodyPr rtlCol="0" anchor="ctr"/>
+          <a:lstStyle/>
+          <a:p>
+            <a:pPr algn="ctr"/>
+            <a:endParaRPr lang="en-US" dirty="0" smtClean="0"/>
+          </a:p>
+          <a:p>
+            <a:pPr algn="ctr"/>
+            <a:endParaRPr/>
+          </a:p>
+          <a:p>
+            <a:pPr algn="ctr"/>
+            <a:endParaRPr lang="en-US" dirty="0" smtClean="0"/>
+          </a:p>
+          <a:p>
+            <a:pPr algn="ctr"/>
+            <a:endParaRPr lang="en-US" dirty="0"/>
+          </a:p>
+        </p:txBody>
+      </p:sp>
+      <p:sp>
+        <p:nvSpPr>
+          <p:cNvPr id="127" name="Rectangle 126"/>
+          <p:cNvSpPr/>
+          <p:nvPr/>
+        </p:nvSpPr>
+        <p:spPr>
+          <a:xfrm flipV="1">
+            <a:off x="7404384" y="4109244"/>
+            <a:ext cx="182880" cy="187261"/>
+          </a:xfrm>
+          <a:prstGeom prst="rect">
+            <a:avLst/>
+          </a:prstGeom>
+          <a:solidFill>
+            <a:schemeClr val="accent4"/>
+          </a:solidFill>
+        </p:spPr>
+        <p:style>
+          <a:lnRef idx="1">
+            <a:schemeClr val="accent1"/>
+          </a:lnRef>
+          <a:fillRef idx="3">
+            <a:schemeClr val="accent1"/>
+          </a:fillRef>
+          <a:effectRef idx="2">
+            <a:schemeClr val="accent1"/>
+          </a:effectRef>
+          <a:fontRef idx="minor">
+            <a:schemeClr val="lt1"/>
+          </a:fontRef>
+        </p:style>
+        <p:txBody>
+          <a:bodyPr rtlCol="0" anchor="ctr"/>
+          <a:lstStyle/>
+          <a:p>
+            <a:pPr algn="ctr"/>
+            <a:endParaRPr lang="en-US" dirty="0" smtClean="0"/>
+          </a:p>
+          <a:p>
+            <a:pPr algn="ctr"/>
+            <a:endParaRPr/>
+          </a:p>
+          <a:p>
+            <a:pPr algn="ctr"/>
+            <a:endParaRPr lang="en-US" dirty="0" smtClean="0"/>
+          </a:p>
+          <a:p>
+            <a:pPr algn="ctr"/>
+            <a:endParaRPr lang="en-US" dirty="0"/>
+          </a:p>
+        </p:txBody>
+      </p:sp>
+      <p:sp>
+        <p:nvSpPr>
+          <p:cNvPr id="129" name="Rectangle 128"/>
+          <p:cNvSpPr/>
+          <p:nvPr/>
+        </p:nvSpPr>
+        <p:spPr>
+          <a:xfrm flipV="1">
+            <a:off x="4739469" y="4109246"/>
+            <a:ext cx="182880" cy="187261"/>
+          </a:xfrm>
+          <a:prstGeom prst="rect">
+            <a:avLst/>
+          </a:prstGeom>
+          <a:solidFill>
+            <a:schemeClr val="accent6"/>
+          </a:solidFill>
+        </p:spPr>
+        <p:style>
+          <a:lnRef idx="1">
+            <a:schemeClr val="accent1"/>
+          </a:lnRef>
+          <a:fillRef idx="3">
+            <a:schemeClr val="accent1"/>
+          </a:fillRef>
+          <a:effectRef idx="2">
+            <a:schemeClr val="accent1"/>
+          </a:effectRef>
+          <a:fontRef idx="minor">
+            <a:schemeClr val="lt1"/>
+          </a:fontRef>
+        </p:style>
+        <p:txBody>
+          <a:bodyPr rtlCol="0" anchor="ctr"/>
+          <a:lstStyle/>
+          <a:p>
+            <a:pPr algn="ctr"/>
+            <a:endParaRPr lang="en-US" dirty="0" smtClean="0"/>
+          </a:p>
+          <a:p>
+            <a:pPr algn="ctr"/>
+            <a:endParaRPr/>
+          </a:p>
+          <a:p>
+            <a:pPr algn="ctr"/>
+            <a:endParaRPr lang="en-US" dirty="0" smtClean="0"/>
+          </a:p>
+          <a:p>
+            <a:pPr algn="ctr"/>
+            <a:endParaRPr lang="en-US" dirty="0"/>
+          </a:p>
+        </p:txBody>
+      </p:sp>
+      <p:cxnSp>
+        <p:nvCxnSpPr>
+          <p:cNvPr id="157" name="Elbow Connector 156"/>
+          <p:cNvCxnSpPr>
+            <a:stCxn id="83" idx="0"/>
+            <a:endCxn id="113" idx="2"/>
+          </p:cNvCxnSpPr>
+          <p:nvPr/>
+        </p:nvCxnSpPr>
+        <p:spPr>
+          <a:xfrm rot="5400000">
+            <a:off x="2181230" y="3816364"/>
+            <a:ext cx="585764" cy="1588"/>
+          </a:xfrm>
+          <a:prstGeom prst="bentConnector3">
+            <a:avLst>
+              <a:gd name="adj1" fmla="val 50000"/>
+            </a:avLst>
+          </a:prstGeom>
+          <a:ln>
+            <a:tailEnd type="arrow"/>
+          </a:ln>
+        </p:spPr>
+        <p:style>
+          <a:lnRef idx="2">
+            <a:schemeClr val="accent1"/>
+          </a:lnRef>
+          <a:fillRef idx="0">
+            <a:schemeClr val="accent1"/>
+          </a:fillRef>
+          <a:effectRef idx="1">
+            <a:schemeClr val="accent1"/>
+          </a:effectRef>
+          <a:fontRef idx="minor">
+            <a:schemeClr val="tx1"/>
+          </a:fontRef>
+        </p:style>
+      </p:cxnSp>
+      <p:cxnSp>
+        <p:nvCxnSpPr>
+          <p:cNvPr id="164" name="Elbow Connector 163"/>
+          <p:cNvCxnSpPr>
+            <a:stCxn id="84" idx="0"/>
+            <a:endCxn id="114" idx="2"/>
+          </p:cNvCxnSpPr>
+          <p:nvPr/>
+        </p:nvCxnSpPr>
+        <p:spPr>
+          <a:xfrm rot="5400000">
+            <a:off x="3864188" y="3816364"/>
+            <a:ext cx="585764" cy="1588"/>
+          </a:xfrm>
+          <a:prstGeom prst="bentConnector3">
+            <a:avLst>
+              <a:gd name="adj1" fmla="val 50000"/>
+            </a:avLst>
+          </a:prstGeom>
+          <a:ln>
+            <a:tailEnd type="arrow"/>
+          </a:ln>
+        </p:spPr>
+        <p:style>
+          <a:lnRef idx="2">
+            <a:schemeClr val="accent1"/>
+          </a:lnRef>
+          <a:fillRef idx="0">
+            <a:schemeClr val="accent1"/>
+          </a:fillRef>
+          <a:effectRef idx="1">
+            <a:schemeClr val="accent1"/>
+          </a:effectRef>
+          <a:fontRef idx="minor">
+            <a:schemeClr val="tx1"/>
+          </a:fontRef>
+        </p:style>
+      </p:cxnSp>
+      <p:cxnSp>
+        <p:nvCxnSpPr>
+          <p:cNvPr id="166" name="Elbow Connector 165"/>
+          <p:cNvCxnSpPr>
+            <a:stCxn id="86" idx="0"/>
+            <a:endCxn id="115" idx="2"/>
+          </p:cNvCxnSpPr>
+          <p:nvPr/>
+        </p:nvCxnSpPr>
+        <p:spPr>
+          <a:xfrm rot="5400000">
+            <a:off x="5535862" y="3816364"/>
+            <a:ext cx="585764" cy="1588"/>
+          </a:xfrm>
+          <a:prstGeom prst="bentConnector3">
+            <a:avLst>
+              <a:gd name="adj1" fmla="val 50000"/>
+            </a:avLst>
+          </a:prstGeom>
+          <a:ln>
+            <a:tailEnd type="arrow"/>
+          </a:ln>
+        </p:spPr>
+        <p:style>
+          <a:lnRef idx="2">
+            <a:schemeClr val="accent1"/>
+          </a:lnRef>
+          <a:fillRef idx="0">
+            <a:schemeClr val="accent1"/>
+          </a:fillRef>
+          <a:effectRef idx="1">
+            <a:schemeClr val="accent1"/>
+          </a:effectRef>
+          <a:fontRef idx="minor">
+            <a:schemeClr val="tx1"/>
+          </a:fontRef>
+        </p:style>
+      </p:cxnSp>
+      <p:cxnSp>
+        <p:nvCxnSpPr>
+          <p:cNvPr id="179" name="Elbow Connector 178"/>
+          <p:cNvCxnSpPr>
+            <a:stCxn id="87" idx="0"/>
+            <a:endCxn id="116" idx="2"/>
+          </p:cNvCxnSpPr>
+          <p:nvPr/>
+        </p:nvCxnSpPr>
+        <p:spPr>
+          <a:xfrm rot="5400000">
+            <a:off x="7207536" y="3816364"/>
+            <a:ext cx="585764" cy="1588"/>
+          </a:xfrm>
+          <a:prstGeom prst="bentConnector3">
+            <a:avLst>
+              <a:gd name="adj1" fmla="val 50000"/>
+            </a:avLst>
+          </a:prstGeom>
+          <a:ln>
+            <a:tailEnd type="arrow"/>
+          </a:ln>
+        </p:spPr>
+        <p:style>
+          <a:lnRef idx="2">
+            <a:schemeClr val="accent1"/>
+          </a:lnRef>
+          <a:fillRef idx="0">
+            <a:schemeClr val="accent1"/>
+          </a:fillRef>
+          <a:effectRef idx="1">
+            <a:schemeClr val="accent1"/>
+          </a:effectRef>
+          <a:fontRef idx="minor">
+            <a:schemeClr val="tx1"/>
+          </a:fontRef>
+        </p:style>
+      </p:cxnSp>
+      <p:cxnSp>
+        <p:nvCxnSpPr>
+          <p:cNvPr id="186" name="Elbow Connector 185"/>
+          <p:cNvCxnSpPr>
+            <a:stCxn id="83" idx="0"/>
+            <a:endCxn id="114" idx="2"/>
+          </p:cNvCxnSpPr>
+          <p:nvPr/>
+        </p:nvCxnSpPr>
+        <p:spPr>
+          <a:xfrm rot="16200000" flipH="1">
+            <a:off x="3022709" y="2974885"/>
+            <a:ext cx="585764" cy="1682958"/>
+          </a:xfrm>
+          <a:prstGeom prst="bentConnector3">
+            <a:avLst>
+              <a:gd name="adj1" fmla="val 50000"/>
+            </a:avLst>
+          </a:prstGeom>
+          <a:ln>
+            <a:tailEnd type="arrow"/>
+          </a:ln>
+        </p:spPr>
+        <p:style>
+          <a:lnRef idx="2">
+            <a:schemeClr val="accent1"/>
+          </a:lnRef>
+          <a:fillRef idx="0">
+            <a:schemeClr val="accent1"/>
+          </a:fillRef>
+          <a:effectRef idx="1">
+            <a:schemeClr val="accent1"/>
+          </a:effectRef>
+          <a:fontRef idx="minor">
+            <a:schemeClr val="tx1"/>
+          </a:fontRef>
+        </p:style>
+      </p:cxnSp>
+      <p:cxnSp>
+        <p:nvCxnSpPr>
+          <p:cNvPr id="189" name="Elbow Connector 188"/>
+          <p:cNvCxnSpPr>
+            <a:stCxn id="83" idx="0"/>
+            <a:endCxn id="115" idx="2"/>
+          </p:cNvCxnSpPr>
+          <p:nvPr/>
+        </p:nvCxnSpPr>
+        <p:spPr>
+          <a:xfrm rot="16200000" flipH="1">
+            <a:off x="3858546" y="2139048"/>
+            <a:ext cx="585764" cy="3354632"/>
+          </a:xfrm>
+          <a:prstGeom prst="bentConnector3">
+            <a:avLst>
+              <a:gd name="adj1" fmla="val 50000"/>
+            </a:avLst>
+          </a:prstGeom>
+          <a:ln>
+            <a:tailEnd type="arrow"/>
+          </a:ln>
+        </p:spPr>
+        <p:style>
+          <a:lnRef idx="2">
+            <a:schemeClr val="accent1"/>
+          </a:lnRef>
+          <a:fillRef idx="0">
+            <a:schemeClr val="accent1"/>
+          </a:fillRef>
+          <a:effectRef idx="1">
+            <a:schemeClr val="accent1"/>
+          </a:effectRef>
+          <a:fontRef idx="minor">
+            <a:schemeClr val="tx1"/>
+          </a:fontRef>
+        </p:style>
+      </p:cxnSp>
+      <p:cxnSp>
+        <p:nvCxnSpPr>
+          <p:cNvPr id="192" name="Elbow Connector 191"/>
+          <p:cNvCxnSpPr>
+            <a:stCxn id="83" idx="0"/>
+            <a:endCxn id="116" idx="2"/>
+          </p:cNvCxnSpPr>
+          <p:nvPr/>
+        </p:nvCxnSpPr>
+        <p:spPr>
+          <a:xfrm rot="16200000" flipH="1">
+            <a:off x="4694383" y="1303211"/>
+            <a:ext cx="585764" cy="5026306"/>
+          </a:xfrm>
+          <a:prstGeom prst="bentConnector3">
+            <a:avLst>
+              <a:gd name="adj1" fmla="val 50000"/>
+            </a:avLst>
+          </a:prstGeom>
+          <a:ln>
+            <a:tailEnd type="arrow"/>
+          </a:ln>
+        </p:spPr>
+        <p:style>
+          <a:lnRef idx="2">
+            <a:schemeClr val="accent1"/>
+          </a:lnRef>
+          <a:fillRef idx="0">
+            <a:schemeClr val="accent1"/>
+          </a:fillRef>
+          <a:effectRef idx="1">
+            <a:schemeClr val="accent1"/>
+          </a:effectRef>
+          <a:fontRef idx="minor">
+            <a:schemeClr val="tx1"/>
+          </a:fontRef>
+        </p:style>
+      </p:cxnSp>
+      <p:sp>
+        <p:nvSpPr>
+          <p:cNvPr id="121" name="Rectangle 120"/>
+          <p:cNvSpPr/>
+          <p:nvPr/>
+        </p:nvSpPr>
+        <p:spPr>
+          <a:xfrm flipV="1">
+            <a:off x="1891713" y="4109246"/>
+            <a:ext cx="182880" cy="187261"/>
+          </a:xfrm>
+          <a:prstGeom prst="rect">
+            <a:avLst/>
+          </a:prstGeom>
+          <a:solidFill>
+            <a:schemeClr val="tx2"/>
+          </a:solidFill>
+        </p:spPr>
+        <p:style>
+          <a:lnRef idx="1">
+            <a:schemeClr val="accent1"/>
+          </a:lnRef>
+          <a:fillRef idx="3">
+            <a:schemeClr val="accent1"/>
+          </a:fillRef>
+          <a:effectRef idx="2">
+            <a:schemeClr val="accent1"/>
+          </a:effectRef>
+          <a:fontRef idx="minor">
+            <a:schemeClr val="lt1"/>
+          </a:fontRef>
+        </p:style>
+        <p:txBody>
+          <a:bodyPr rtlCol="0" anchor="ctr"/>
+          <a:lstStyle/>
+          <a:p>
+            <a:pPr algn="ctr"/>
+            <a:endParaRPr lang="en-US" dirty="0" smtClean="0"/>
+          </a:p>
+          <a:p>
+            <a:pPr algn="ctr"/>
+            <a:endParaRPr/>
+          </a:p>
+          <a:p>
+            <a:pPr algn="ctr"/>
+            <a:endParaRPr lang="en-US" dirty="0" smtClean="0"/>
+          </a:p>
+          <a:p>
+            <a:pPr algn="ctr"/>
+            <a:endParaRPr lang="en-US" dirty="0"/>
+          </a:p>
+        </p:txBody>
+      </p:sp>
+      <p:sp>
+        <p:nvSpPr>
+          <p:cNvPr id="125" name="Rectangle 124"/>
+          <p:cNvSpPr/>
+          <p:nvPr/>
+        </p:nvSpPr>
+        <p:spPr>
+          <a:xfrm flipV="1">
+            <a:off x="2618639" y="4296505"/>
+            <a:ext cx="182880" cy="187261"/>
+          </a:xfrm>
+          <a:prstGeom prst="rect">
+            <a:avLst/>
+          </a:prstGeom>
+          <a:solidFill>
+            <a:schemeClr val="accent3"/>
+          </a:solidFill>
+        </p:spPr>
+        <p:style>
+          <a:lnRef idx="1">
+            <a:schemeClr val="accent1"/>
+          </a:lnRef>
+          <a:fillRef idx="3">
+            <a:schemeClr val="accent1"/>
+          </a:fillRef>
+          <a:effectRef idx="2">
+            <a:schemeClr val="accent1"/>
+          </a:effectRef>
+          <a:fontRef idx="minor">
+            <a:schemeClr val="lt1"/>
+          </a:fontRef>
+        </p:style>
+        <p:txBody>
+          <a:bodyPr rtlCol="0" anchor="ctr"/>
+          <a:lstStyle/>
+          <a:p>
+            <a:pPr algn="ctr"/>
+            <a:endParaRPr lang="en-US" dirty="0" smtClean="0"/>
+          </a:p>
+          <a:p>
+            <a:pPr algn="ctr"/>
+            <a:endParaRPr/>
+          </a:p>
+          <a:p>
+            <a:pPr algn="ctr"/>
+            <a:endParaRPr lang="en-US" dirty="0" smtClean="0"/>
+          </a:p>
+          <a:p>
+            <a:pPr algn="ctr"/>
+            <a:endParaRPr lang="en-US" dirty="0"/>
+          </a:p>
+        </p:txBody>
+      </p:sp>
+      <p:sp>
+        <p:nvSpPr>
+          <p:cNvPr id="130" name="Rectangle 129"/>
+          <p:cNvSpPr/>
+          <p:nvPr/>
+        </p:nvSpPr>
+        <p:spPr>
+          <a:xfrm flipV="1">
+            <a:off x="2618639" y="4110040"/>
+            <a:ext cx="182880" cy="187261"/>
+          </a:xfrm>
+          <a:prstGeom prst="rect">
+            <a:avLst/>
+          </a:prstGeom>
+          <a:solidFill>
+            <a:schemeClr val="accent6"/>
+          </a:solidFill>
+        </p:spPr>
+        <p:style>
+          <a:lnRef idx="1">
+            <a:schemeClr val="accent1"/>
+          </a:lnRef>
+          <a:fillRef idx="3">
+            <a:schemeClr val="accent1"/>
+          </a:fillRef>
+          <a:effectRef idx="2">
+            <a:schemeClr val="accent1"/>
+          </a:effectRef>
+          <a:fontRef idx="minor">
+            <a:schemeClr val="lt1"/>
+          </a:fontRef>
+        </p:style>
+        <p:txBody>
+          <a:bodyPr rtlCol="0" anchor="ctr"/>
+          <a:lstStyle/>
+          <a:p>
+            <a:pPr algn="ctr"/>
+            <a:endParaRPr lang="en-US" dirty="0" smtClean="0"/>
+          </a:p>
+          <a:p>
+            <a:pPr algn="ctr"/>
+            <a:endParaRPr/>
+          </a:p>
+          <a:p>
+            <a:pPr algn="ctr"/>
+            <a:endParaRPr lang="en-US" dirty="0" smtClean="0"/>
+          </a:p>
+          <a:p>
+            <a:pPr algn="ctr"/>
+            <a:endParaRPr lang="en-US" dirty="0"/>
+          </a:p>
+        </p:txBody>
+      </p:sp>
+      <p:sp>
+        <p:nvSpPr>
+          <p:cNvPr id="196" name="Rectangle 195"/>
+          <p:cNvSpPr/>
+          <p:nvPr/>
+        </p:nvSpPr>
+        <p:spPr>
+          <a:xfrm flipV="1">
+            <a:off x="1887119" y="4296505"/>
+            <a:ext cx="182880" cy="187261"/>
+          </a:xfrm>
+          <a:prstGeom prst="rect">
+            <a:avLst/>
+          </a:prstGeom>
+          <a:solidFill>
+            <a:schemeClr val="accent3"/>
+          </a:solidFill>
+        </p:spPr>
+        <p:style>
+          <a:lnRef idx="1">
+            <a:schemeClr val="accent1"/>
+          </a:lnRef>
+          <a:fillRef idx="3">
+            <a:schemeClr val="accent1"/>
+          </a:fillRef>
+          <a:effectRef idx="2">
+            <a:schemeClr val="accent1"/>
+          </a:effectRef>
+          <a:fontRef idx="minor">
+            <a:schemeClr val="lt1"/>
+          </a:fontRef>
+        </p:style>
+        <p:txBody>
+          <a:bodyPr rtlCol="0" anchor="ctr"/>
+          <a:lstStyle/>
+          <a:p>
+            <a:pPr algn="ctr"/>
+            <a:endParaRPr lang="en-US" dirty="0" smtClean="0"/>
+          </a:p>
+          <a:p>
+            <a:pPr algn="ctr"/>
+            <a:endParaRPr/>
+          </a:p>
+          <a:p>
+            <a:pPr algn="ctr"/>
+            <a:endParaRPr lang="en-US" dirty="0" smtClean="0"/>
+          </a:p>
+          <a:p>
+            <a:pPr algn="ctr"/>
+            <a:endParaRPr lang="en-US" dirty="0"/>
+          </a:p>
+        </p:txBody>
+      </p:sp>
+      <p:sp>
+        <p:nvSpPr>
+          <p:cNvPr id="197" name="Rectangle 196"/>
+          <p:cNvSpPr/>
+          <p:nvPr/>
+        </p:nvSpPr>
+        <p:spPr>
+          <a:xfrm>
+            <a:off x="4734875" y="4296505"/>
+            <a:ext cx="182880" cy="182880"/>
+          </a:xfrm>
+          <a:prstGeom prst="rect">
+            <a:avLst/>
+          </a:prstGeom>
+          <a:solidFill>
+            <a:schemeClr val="bg2">
+              <a:lumMod val="75000"/>
+            </a:schemeClr>
+          </a:solidFill>
+        </p:spPr>
+        <p:style>
+          <a:lnRef idx="1">
+            <a:schemeClr val="accent1"/>
+          </a:lnRef>
+          <a:fillRef idx="3">
+            <a:schemeClr val="accent1"/>
+          </a:fillRef>
+          <a:effectRef idx="2">
+            <a:schemeClr val="accent1"/>
+          </a:effectRef>
+          <a:fontRef idx="minor">
+            <a:schemeClr val="lt1"/>
+          </a:fontRef>
+        </p:style>
+        <p:txBody>
+          <a:bodyPr rtlCol="0" anchor="ctr"/>
+          <a:lstStyle/>
+          <a:p>
+            <a:pPr algn="ctr"/>
+            <a:endParaRPr lang="en-US"/>
+          </a:p>
+        </p:txBody>
+      </p:sp>
+      <p:sp>
+        <p:nvSpPr>
+          <p:cNvPr id="202" name="Rectangle 201"/>
+          <p:cNvSpPr/>
+          <p:nvPr/>
+        </p:nvSpPr>
+        <p:spPr>
+          <a:xfrm>
+            <a:off x="7409772" y="4300888"/>
+            <a:ext cx="182880" cy="182880"/>
+          </a:xfrm>
+          <a:prstGeom prst="rect">
+            <a:avLst/>
+          </a:prstGeom>
+          <a:solidFill>
+            <a:schemeClr val="accent2">
+              <a:lumMod val="40000"/>
+              <a:lumOff val="60000"/>
+            </a:schemeClr>
+          </a:solidFill>
+        </p:spPr>
+        <p:style>
+          <a:lnRef idx="1">
+            <a:schemeClr val="accent1"/>
+          </a:lnRef>
+          <a:fillRef idx="3">
+            <a:schemeClr val="accent1"/>
+          </a:fillRef>
+          <a:effectRef idx="2">
+            <a:schemeClr val="accent1"/>
+          </a:effectRef>
+          <a:fontRef idx="minor">
+            <a:schemeClr val="lt1"/>
+          </a:fontRef>
+        </p:style>
+        <p:txBody>
+          <a:bodyPr rtlCol="0" anchor="ctr"/>
+          <a:lstStyle/>
+          <a:p>
+            <a:pPr algn="ctr"/>
+            <a:endParaRPr lang="en-US"/>
+          </a:p>
+        </p:txBody>
+      </p:sp>
+      <p:sp>
+        <p:nvSpPr>
+          <p:cNvPr id="203" name="TextBox 202"/>
+          <p:cNvSpPr txBox="1"/>
+          <p:nvPr/>
+        </p:nvSpPr>
+        <p:spPr>
+          <a:xfrm>
+            <a:off x="1296755" y="3205579"/>
+            <a:ext cx="407484" cy="461665"/>
+          </a:xfrm>
+          <a:prstGeom prst="rect">
+            <a:avLst/>
+          </a:prstGeom>
+          <a:noFill/>
+        </p:spPr>
+        <p:txBody>
+          <a:bodyPr wrap="none" rtlCol="0">
+            <a:spAutoFit/>
+          </a:bodyPr>
+          <a:lstStyle/>
+          <a:p>
+            <a:r>
+              <a:rPr lang="en-US" sz="2400" dirty="0" smtClean="0">
+                <a:latin typeface="Times New Roman" pitchFamily="18" charset="0"/>
+                <a:cs typeface="Times New Roman" pitchFamily="18" charset="0"/>
+              </a:rPr>
+              <a:t>A</a:t>
+            </a:r>
+            <a:endParaRPr lang="en-US" sz="2400" dirty="0">
+              <a:latin typeface="Times New Roman" pitchFamily="18" charset="0"/>
+              <a:cs typeface="Times New Roman" pitchFamily="18" charset="0"/>
+            </a:endParaRPr>
+          </a:p>
+        </p:txBody>
+      </p:sp>
+      <p:sp>
+        <p:nvSpPr>
+          <p:cNvPr id="204" name="TextBox 203"/>
+          <p:cNvSpPr txBox="1"/>
+          <p:nvPr/>
+        </p:nvSpPr>
+        <p:spPr>
+          <a:xfrm>
+            <a:off x="1318983" y="4033106"/>
+            <a:ext cx="389850" cy="461665"/>
+          </a:xfrm>
+          <a:prstGeom prst="rect">
+            <a:avLst/>
+          </a:prstGeom>
+          <a:noFill/>
+        </p:spPr>
+        <p:txBody>
+          <a:bodyPr wrap="none" rtlCol="0">
+            <a:spAutoFit/>
+          </a:bodyPr>
+          <a:lstStyle/>
+          <a:p>
+            <a:r>
+              <a:rPr lang="en-US" sz="2400" dirty="0" smtClean="0">
+                <a:latin typeface="Times New Roman" pitchFamily="18" charset="0"/>
+                <a:cs typeface="Times New Roman" pitchFamily="18" charset="0"/>
+              </a:rPr>
+              <a:t>B</a:t>
             </a:r>
             <a:endParaRPr lang="en-US" sz="2400" dirty="0">
               <a:latin typeface="Times New Roman" pitchFamily="18" charset="0"/>

</xml_diff>